<commit_message>
Présentation v0.52 (notes et animations)
</commit_message>
<xml_diff>
--- a/Commande.pptx
+++ b/Commande.pptx
@@ -527,6 +527,16 @@
           <a:bodyPr/>
           <a:lstStyle/>
           <a:p>
+            <a:r>
+              <a:rPr lang="fr-FR" dirty="0" smtClean="0"/>
+              <a:t>GUI, Disco</a:t>
+            </a:r>
+          </a:p>
+          <a:p>
+            <a:r>
+              <a:rPr lang="fr-FR" smtClean="0"/>
+              <a:t>Bibliothèque</a:t>
+            </a:r>
             <a:endParaRPr lang="fr-FR"/>
           </a:p>
         </p:txBody>
@@ -4061,7 +4071,7 @@
         </p:nvSpPr>
         <p:spPr>
           <a:xfrm>
-            <a:off x="517585" y="5211433"/>
+            <a:off x="274319" y="6025249"/>
             <a:ext cx="2747227" cy="507831"/>
           </a:xfrm>
           <a:prstGeom prst="rect">
@@ -4106,9 +4116,168 @@
   <p:timing>
     <p:tnLst>
       <p:par>
-        <p:cTn id="1" dur="indefinite" restart="never" nodeType="tmRoot"/>
+        <p:cTn id="1" dur="indefinite" restart="never" nodeType="tmRoot">
+          <p:childTnLst>
+            <p:seq concurrent="1" nextAc="seek">
+              <p:cTn id="2" dur="indefinite" nodeType="mainSeq">
+                <p:childTnLst>
+                  <p:par>
+                    <p:cTn id="3" fill="hold">
+                      <p:stCondLst>
+                        <p:cond delay="indefinite"/>
+                      </p:stCondLst>
+                      <p:childTnLst>
+                        <p:par>
+                          <p:cTn id="4" fill="hold">
+                            <p:stCondLst>
+                              <p:cond delay="0"/>
+                            </p:stCondLst>
+                            <p:childTnLst>
+                              <p:par>
+                                <p:cTn id="5" presetID="10" presetClass="entr" presetSubtype="0" fill="hold" grpId="0" nodeType="clickEffect">
+                                  <p:stCondLst>
+                                    <p:cond delay="0"/>
+                                  </p:stCondLst>
+                                  <p:childTnLst>
+                                    <p:set>
+                                      <p:cBhvr>
+                                        <p:cTn id="6" dur="1" fill="hold">
+                                          <p:stCondLst>
+                                            <p:cond delay="0"/>
+                                          </p:stCondLst>
+                                        </p:cTn>
+                                        <p:tgtEl>
+                                          <p:spTgt spid="2"/>
+                                        </p:tgtEl>
+                                        <p:attrNameLst>
+                                          <p:attrName>style.visibility</p:attrName>
+                                        </p:attrNameLst>
+                                      </p:cBhvr>
+                                      <p:to>
+                                        <p:strVal val="visible"/>
+                                      </p:to>
+                                    </p:set>
+                                    <p:animEffect transition="in" filter="fade">
+                                      <p:cBhvr>
+                                        <p:cTn id="7" dur="500"/>
+                                        <p:tgtEl>
+                                          <p:spTgt spid="2"/>
+                                        </p:tgtEl>
+                                      </p:cBhvr>
+                                    </p:animEffect>
+                                  </p:childTnLst>
+                                </p:cTn>
+                              </p:par>
+                              <p:par>
+                                <p:cTn id="8" presetID="10" presetClass="entr" presetSubtype="0" fill="hold" grpId="0" nodeType="withEffect">
+                                  <p:stCondLst>
+                                    <p:cond delay="0"/>
+                                  </p:stCondLst>
+                                  <p:childTnLst>
+                                    <p:set>
+                                      <p:cBhvr>
+                                        <p:cTn id="9" dur="1" fill="hold">
+                                          <p:stCondLst>
+                                            <p:cond delay="0"/>
+                                          </p:stCondLst>
+                                        </p:cTn>
+                                        <p:tgtEl>
+                                          <p:spTgt spid="3">
+                                            <p:txEl>
+                                              <p:pRg st="0" end="0"/>
+                                            </p:txEl>
+                                          </p:spTgt>
+                                        </p:tgtEl>
+                                        <p:attrNameLst>
+                                          <p:attrName>style.visibility</p:attrName>
+                                        </p:attrNameLst>
+                                      </p:cBhvr>
+                                      <p:to>
+                                        <p:strVal val="visible"/>
+                                      </p:to>
+                                    </p:set>
+                                    <p:animEffect transition="in" filter="fade">
+                                      <p:cBhvr>
+                                        <p:cTn id="10" dur="500"/>
+                                        <p:tgtEl>
+                                          <p:spTgt spid="3">
+                                            <p:txEl>
+                                              <p:pRg st="0" end="0"/>
+                                            </p:txEl>
+                                          </p:spTgt>
+                                        </p:tgtEl>
+                                      </p:cBhvr>
+                                    </p:animEffect>
+                                  </p:childTnLst>
+                                </p:cTn>
+                              </p:par>
+                              <p:par>
+                                <p:cTn id="11" presetID="10" presetClass="entr" presetSubtype="0" fill="hold" grpId="0" nodeType="withEffect">
+                                  <p:stCondLst>
+                                    <p:cond delay="0"/>
+                                  </p:stCondLst>
+                                  <p:childTnLst>
+                                    <p:set>
+                                      <p:cBhvr>
+                                        <p:cTn id="12" dur="1" fill="hold">
+                                          <p:stCondLst>
+                                            <p:cond delay="0"/>
+                                          </p:stCondLst>
+                                        </p:cTn>
+                                        <p:tgtEl>
+                                          <p:spTgt spid="5"/>
+                                        </p:tgtEl>
+                                        <p:attrNameLst>
+                                          <p:attrName>style.visibility</p:attrName>
+                                        </p:attrNameLst>
+                                      </p:cBhvr>
+                                      <p:to>
+                                        <p:strVal val="visible"/>
+                                      </p:to>
+                                    </p:set>
+                                    <p:animEffect transition="in" filter="fade">
+                                      <p:cBhvr>
+                                        <p:cTn id="13" dur="500"/>
+                                        <p:tgtEl>
+                                          <p:spTgt spid="5"/>
+                                        </p:tgtEl>
+                                      </p:cBhvr>
+                                    </p:animEffect>
+                                  </p:childTnLst>
+                                </p:cTn>
+                              </p:par>
+                            </p:childTnLst>
+                          </p:cTn>
+                        </p:par>
+                      </p:childTnLst>
+                    </p:cTn>
+                  </p:par>
+                </p:childTnLst>
+              </p:cTn>
+              <p:prevCondLst>
+                <p:cond evt="onPrev" delay="0">
+                  <p:tgtEl>
+                    <p:sldTgt/>
+                  </p:tgtEl>
+                </p:cond>
+              </p:prevCondLst>
+              <p:nextCondLst>
+                <p:cond evt="onNext" delay="0">
+                  <p:tgtEl>
+                    <p:sldTgt/>
+                  </p:tgtEl>
+                </p:cond>
+              </p:nextCondLst>
+            </p:seq>
+          </p:childTnLst>
+        </p:cTn>
       </p:par>
     </p:tnLst>
+    <p:bldLst>
+      <p:bldP spid="2" grpId="0"/>
+      <p:bldP spid="3" grpId="0" build="p"/>
+      <p:bldP spid="5" grpId="0"/>
+    </p:bldLst>
   </p:timing>
 </p:sld>
 </file>
@@ -4878,6 +5047,13 @@
   <p:clrMapOvr>
     <a:masterClrMapping/>
   </p:clrMapOvr>
+  <p:timing>
+    <p:tnLst>
+      <p:par>
+        <p:cTn id="1" dur="indefinite" restart="never" nodeType="tmRoot"/>
+      </p:par>
+    </p:tnLst>
+  </p:timing>
 </p:sld>
 </file>
 

</xml_diff>